<commit_message>
picture tony + smile being filmed pictures
</commit_message>
<xml_diff>
--- a/Slides.pptx
+++ b/Slides.pptx
@@ -6580,6 +6580,42 @@
           </a:p>
         </p:txBody>
       </p:sp>
+      <p:pic>
+        <p:nvPicPr>
+          <p:cNvPr id="3" name="Picture 2">
+            <a:extLst>
+              <a:ext uri="{FF2B5EF4-FFF2-40B4-BE49-F238E27FC236}">
+                <a16:creationId xmlns:a16="http://schemas.microsoft.com/office/drawing/2014/main" id="{06812AA7-44B0-41D8-8FA5-83E09B7F4285}"/>
+              </a:ext>
+            </a:extLst>
+          </p:cNvPr>
+          <p:cNvPicPr>
+            <a:picLocks noChangeAspect="1"/>
+          </p:cNvPicPr>
+          <p:nvPr/>
+        </p:nvPicPr>
+        <p:blipFill>
+          <a:blip r:embed="rId4" cstate="print">
+            <a:extLst>
+              <a:ext uri="{28A0092B-C50C-407E-A947-70E740481C1C}">
+                <a14:useLocalDpi xmlns:a14="http://schemas.microsoft.com/office/drawing/2010/main" val="0"/>
+              </a:ext>
+            </a:extLst>
+          </a:blip>
+          <a:stretch>
+            <a:fillRect/>
+          </a:stretch>
+        </p:blipFill>
+        <p:spPr>
+          <a:xfrm>
+            <a:off x="7250571" y="130961"/>
+            <a:ext cx="1652019" cy="2438405"/>
+          </a:xfrm>
+          <a:prstGeom prst="rect">
+            <a:avLst/>
+          </a:prstGeom>
+        </p:spPr>
+      </p:pic>
     </p:spTree>
     <p:extLst>
       <p:ext uri="{BB962C8B-B14F-4D97-AF65-F5344CB8AC3E}">
@@ -29135,8 +29171,8 @@
         </p:nvSpPr>
         <p:spPr>
           <a:xfrm>
-            <a:off x="685346" y="1732451"/>
-            <a:ext cx="7765322" cy="970450"/>
+            <a:off x="685346" y="1732450"/>
+            <a:ext cx="7765322" cy="1696549"/>
           </a:xfrm>
         </p:spPr>
         <p:txBody>
@@ -29158,7 +29194,16 @@
             </a:r>
             <a:r>
               <a:rPr lang="nl-BE" i="1" dirty="0"/>
-              <a:t> “I call it my billion-dollar mistake”</a:t>
+              <a:t> 	</a:t>
+            </a:r>
+          </a:p>
+          <a:p>
+            <a:pPr marL="36900" indent="0">
+              <a:buNone/>
+            </a:pPr>
+            <a:r>
+              <a:rPr lang="nl-BE" i="1" dirty="0"/>
+              <a:t>			“I call it my billion-dollar mistake”</a:t>
             </a:r>
           </a:p>
           <a:p>
@@ -29216,7 +29261,7 @@
         </p:nvSpPr>
         <p:spPr>
           <a:xfrm>
-            <a:off x="1043608" y="2564904"/>
+            <a:off x="1043608" y="4386887"/>
             <a:ext cx="7632848" cy="1477328"/>
           </a:xfrm>
           <a:prstGeom prst="rect">
@@ -29346,6 +29391,42 @@
           </a:p>
         </p:txBody>
       </p:sp>
+      <p:pic>
+        <p:nvPicPr>
+          <p:cNvPr id="7" name="Picture 6">
+            <a:extLst>
+              <a:ext uri="{FF2B5EF4-FFF2-40B4-BE49-F238E27FC236}">
+                <a16:creationId xmlns:a16="http://schemas.microsoft.com/office/drawing/2014/main" id="{E90B277A-9F7B-4287-9A1B-290755D1CDE4}"/>
+              </a:ext>
+            </a:extLst>
+          </p:cNvPr>
+          <p:cNvPicPr>
+            <a:picLocks noChangeAspect="1"/>
+          </p:cNvPicPr>
+          <p:nvPr/>
+        </p:nvPicPr>
+        <p:blipFill>
+          <a:blip r:embed="rId4">
+            <a:extLst>
+              <a:ext uri="{28A0092B-C50C-407E-A947-70E740481C1C}">
+                <a14:useLocalDpi xmlns:a14="http://schemas.microsoft.com/office/drawing/2010/main" val="0"/>
+              </a:ext>
+            </a:extLst>
+          </a:blip>
+          <a:stretch>
+            <a:fillRect/>
+          </a:stretch>
+        </p:blipFill>
+        <p:spPr>
+          <a:xfrm>
+            <a:off x="6618278" y="2011918"/>
+            <a:ext cx="2095500" cy="2095500"/>
+          </a:xfrm>
+          <a:prstGeom prst="rect">
+            <a:avLst/>
+          </a:prstGeom>
+        </p:spPr>
+      </p:pic>
     </p:spTree>
     <p:extLst>
       <p:ext uri="{BB962C8B-B14F-4D97-AF65-F5344CB8AC3E}">

</xml_diff>